<commit_message>
adding Flora markdown files
</commit_message>
<xml_diff>
--- a/Documents/Flowdiagram.pptx
+++ b/Documents/Flowdiagram.pptx
@@ -248,7 +248,7 @@
           <a:p>
             <a:fld id="{4FB35931-4946-41BF-99CA-95FA0749EF9B}" type="datetimeFigureOut">
               <a:rPr lang="en-AU" smtClean="0"/>
-              <a:t>14/11/2017</a:t>
+              <a:t>8/01/2018</a:t>
             </a:fld>
             <a:endParaRPr lang="en-AU"/>
           </a:p>
@@ -418,7 +418,7 @@
           <a:p>
             <a:fld id="{4FB35931-4946-41BF-99CA-95FA0749EF9B}" type="datetimeFigureOut">
               <a:rPr lang="en-AU" smtClean="0"/>
-              <a:t>14/11/2017</a:t>
+              <a:t>8/01/2018</a:t>
             </a:fld>
             <a:endParaRPr lang="en-AU"/>
           </a:p>
@@ -598,7 +598,7 @@
           <a:p>
             <a:fld id="{4FB35931-4946-41BF-99CA-95FA0749EF9B}" type="datetimeFigureOut">
               <a:rPr lang="en-AU" smtClean="0"/>
-              <a:t>14/11/2017</a:t>
+              <a:t>8/01/2018</a:t>
             </a:fld>
             <a:endParaRPr lang="en-AU"/>
           </a:p>
@@ -768,7 +768,7 @@
           <a:p>
             <a:fld id="{4FB35931-4946-41BF-99CA-95FA0749EF9B}" type="datetimeFigureOut">
               <a:rPr lang="en-AU" smtClean="0"/>
-              <a:t>14/11/2017</a:t>
+              <a:t>8/01/2018</a:t>
             </a:fld>
             <a:endParaRPr lang="en-AU"/>
           </a:p>
@@ -1012,7 +1012,7 @@
           <a:p>
             <a:fld id="{4FB35931-4946-41BF-99CA-95FA0749EF9B}" type="datetimeFigureOut">
               <a:rPr lang="en-AU" smtClean="0"/>
-              <a:t>14/11/2017</a:t>
+              <a:t>8/01/2018</a:t>
             </a:fld>
             <a:endParaRPr lang="en-AU"/>
           </a:p>
@@ -1244,7 +1244,7 @@
           <a:p>
             <a:fld id="{4FB35931-4946-41BF-99CA-95FA0749EF9B}" type="datetimeFigureOut">
               <a:rPr lang="en-AU" smtClean="0"/>
-              <a:t>14/11/2017</a:t>
+              <a:t>8/01/2018</a:t>
             </a:fld>
             <a:endParaRPr lang="en-AU"/>
           </a:p>
@@ -1611,7 +1611,7 @@
           <a:p>
             <a:fld id="{4FB35931-4946-41BF-99CA-95FA0749EF9B}" type="datetimeFigureOut">
               <a:rPr lang="en-AU" smtClean="0"/>
-              <a:t>14/11/2017</a:t>
+              <a:t>8/01/2018</a:t>
             </a:fld>
             <a:endParaRPr lang="en-AU"/>
           </a:p>
@@ -1729,7 +1729,7 @@
           <a:p>
             <a:fld id="{4FB35931-4946-41BF-99CA-95FA0749EF9B}" type="datetimeFigureOut">
               <a:rPr lang="en-AU" smtClean="0"/>
-              <a:t>14/11/2017</a:t>
+              <a:t>8/01/2018</a:t>
             </a:fld>
             <a:endParaRPr lang="en-AU"/>
           </a:p>
@@ -1824,7 +1824,7 @@
           <a:p>
             <a:fld id="{4FB35931-4946-41BF-99CA-95FA0749EF9B}" type="datetimeFigureOut">
               <a:rPr lang="en-AU" smtClean="0"/>
-              <a:t>14/11/2017</a:t>
+              <a:t>8/01/2018</a:t>
             </a:fld>
             <a:endParaRPr lang="en-AU"/>
           </a:p>
@@ -2101,7 +2101,7 @@
           <a:p>
             <a:fld id="{4FB35931-4946-41BF-99CA-95FA0749EF9B}" type="datetimeFigureOut">
               <a:rPr lang="en-AU" smtClean="0"/>
-              <a:t>14/11/2017</a:t>
+              <a:t>8/01/2018</a:t>
             </a:fld>
             <a:endParaRPr lang="en-AU"/>
           </a:p>
@@ -2358,7 +2358,7 @@
           <a:p>
             <a:fld id="{4FB35931-4946-41BF-99CA-95FA0749EF9B}" type="datetimeFigureOut">
               <a:rPr lang="en-AU" smtClean="0"/>
-              <a:t>14/11/2017</a:t>
+              <a:t>8/01/2018</a:t>
             </a:fld>
             <a:endParaRPr lang="en-AU"/>
           </a:p>
@@ -2571,7 +2571,7 @@
           <a:p>
             <a:fld id="{4FB35931-4946-41BF-99CA-95FA0749EF9B}" type="datetimeFigureOut">
               <a:rPr lang="en-AU" smtClean="0"/>
-              <a:t>14/11/2017</a:t>
+              <a:t>8/01/2018</a:t>
             </a:fld>
             <a:endParaRPr lang="en-AU"/>
           </a:p>
@@ -4381,7 +4381,7 @@
         </p:nvSpPr>
         <p:spPr>
           <a:xfrm>
-            <a:off x="1606987" y="487475"/>
+            <a:off x="302711" y="1511862"/>
             <a:ext cx="2884990" cy="730250"/>
           </a:xfrm>
           <a:prstGeom prst="rect">
@@ -4434,49 +4434,6 @@
           </a:p>
         </p:txBody>
       </p:sp>
-      <p:cxnSp>
-        <p:nvCxnSpPr>
-          <p:cNvPr id="7" name="Straight Arrow Connector 6">
-            <a:extLst>
-              <a:ext uri="{FF2B5EF4-FFF2-40B4-BE49-F238E27FC236}">
-                <a16:creationId xmlns:a16="http://schemas.microsoft.com/office/drawing/2014/main" id="{A652D077-668D-466A-A457-B60CE1318ABD}"/>
-              </a:ext>
-            </a:extLst>
-          </p:cNvPr>
-          <p:cNvCxnSpPr>
-            <a:cxnSpLocks/>
-            <a:stCxn id="5" idx="2"/>
-            <a:endCxn id="10" idx="0"/>
-          </p:cNvCxnSpPr>
-          <p:nvPr/>
-        </p:nvCxnSpPr>
-        <p:spPr>
-          <a:xfrm>
-            <a:off x="3049482" y="1217725"/>
-            <a:ext cx="10" cy="884125"/>
-          </a:xfrm>
-          <a:prstGeom prst="straightConnector1">
-            <a:avLst/>
-          </a:prstGeom>
-          <a:ln>
-            <a:tailEnd type="triangle"/>
-          </a:ln>
-        </p:spPr>
-        <p:style>
-          <a:lnRef idx="1">
-            <a:schemeClr val="accent1"/>
-          </a:lnRef>
-          <a:fillRef idx="0">
-            <a:schemeClr val="accent1"/>
-          </a:fillRef>
-          <a:effectRef idx="0">
-            <a:schemeClr val="accent1"/>
-          </a:effectRef>
-          <a:fontRef idx="minor">
-            <a:schemeClr val="tx1"/>
-          </a:fontRef>
-        </p:style>
-      </p:cxnSp>
       <p:sp>
         <p:nvSpPr>
           <p:cNvPr id="10" name="Rectangle 9">
@@ -4491,7 +4448,7 @@
         </p:nvSpPr>
         <p:spPr>
           <a:xfrm>
-            <a:off x="1607006" y="2101850"/>
+            <a:off x="3807056" y="2159971"/>
             <a:ext cx="2884971" cy="1015663"/>
           </a:xfrm>
           <a:prstGeom prst="rect">
@@ -4559,6 +4516,580 @@
           </a:p>
         </p:txBody>
       </p:sp>
+      <p:sp>
+        <p:nvSpPr>
+          <p:cNvPr id="3" name="Rectangle 2">
+            <a:extLst>
+              <a:ext uri="{FF2B5EF4-FFF2-40B4-BE49-F238E27FC236}">
+                <a16:creationId xmlns:a16="http://schemas.microsoft.com/office/drawing/2014/main" id="{099C35AB-EF46-4585-8EDA-EDEED95851D5}"/>
+              </a:ext>
+            </a:extLst>
+          </p:cNvPr>
+          <p:cNvSpPr/>
+          <p:nvPr/>
+        </p:nvSpPr>
+        <p:spPr>
+          <a:xfrm>
+            <a:off x="1765737" y="265562"/>
+            <a:ext cx="2946400" cy="655188"/>
+          </a:xfrm>
+          <a:prstGeom prst="rect">
+            <a:avLst/>
+          </a:prstGeom>
+        </p:spPr>
+        <p:style>
+          <a:lnRef idx="2">
+            <a:schemeClr val="accent1">
+              <a:shade val="50000"/>
+            </a:schemeClr>
+          </a:lnRef>
+          <a:fillRef idx="1">
+            <a:schemeClr val="accent1"/>
+          </a:fillRef>
+          <a:effectRef idx="0">
+            <a:schemeClr val="accent1"/>
+          </a:effectRef>
+          <a:fontRef idx="minor">
+            <a:schemeClr val="lt1"/>
+          </a:fontRef>
+        </p:style>
+        <p:txBody>
+          <a:bodyPr rtlCol="0" anchor="ctr"/>
+          <a:lstStyle/>
+          <a:p>
+            <a:pPr algn="ctr"/>
+            <a:r>
+              <a:rPr lang="en-AU" sz="1400" dirty="0"/>
+              <a:t>I understand calibration well and want to have more control over the process</a:t>
+            </a:r>
+          </a:p>
+        </p:txBody>
+      </p:sp>
+      <p:cxnSp>
+        <p:nvCxnSpPr>
+          <p:cNvPr id="8" name="Straight Arrow Connector 7">
+            <a:extLst>
+              <a:ext uri="{FF2B5EF4-FFF2-40B4-BE49-F238E27FC236}">
+                <a16:creationId xmlns:a16="http://schemas.microsoft.com/office/drawing/2014/main" id="{5DF5D890-F83B-49D6-BF97-499750CA0042}"/>
+              </a:ext>
+            </a:extLst>
+          </p:cNvPr>
+          <p:cNvCxnSpPr>
+            <a:stCxn id="3" idx="2"/>
+            <a:endCxn id="5" idx="0"/>
+          </p:cNvCxnSpPr>
+          <p:nvPr/>
+        </p:nvCxnSpPr>
+        <p:spPr>
+          <a:xfrm flipH="1">
+            <a:off x="1745206" y="920750"/>
+            <a:ext cx="1493731" cy="591112"/>
+          </a:xfrm>
+          <a:prstGeom prst="straightConnector1">
+            <a:avLst/>
+          </a:prstGeom>
+          <a:ln>
+            <a:tailEnd type="triangle"/>
+          </a:ln>
+        </p:spPr>
+        <p:style>
+          <a:lnRef idx="1">
+            <a:schemeClr val="accent1"/>
+          </a:lnRef>
+          <a:fillRef idx="0">
+            <a:schemeClr val="accent1"/>
+          </a:fillRef>
+          <a:effectRef idx="0">
+            <a:schemeClr val="accent1"/>
+          </a:effectRef>
+          <a:fontRef idx="minor">
+            <a:schemeClr val="tx1"/>
+          </a:fontRef>
+        </p:style>
+      </p:cxnSp>
+      <p:sp>
+        <p:nvSpPr>
+          <p:cNvPr id="9" name="Rectangle 8">
+            <a:extLst>
+              <a:ext uri="{FF2B5EF4-FFF2-40B4-BE49-F238E27FC236}">
+                <a16:creationId xmlns:a16="http://schemas.microsoft.com/office/drawing/2014/main" id="{C2D70078-FB52-4DE8-8F28-060D60F5F0CE}"/>
+              </a:ext>
+            </a:extLst>
+          </p:cNvPr>
+          <p:cNvSpPr/>
+          <p:nvPr/>
+        </p:nvSpPr>
+        <p:spPr>
+          <a:xfrm>
+            <a:off x="403666" y="3707495"/>
+            <a:ext cx="2559050" cy="730250"/>
+          </a:xfrm>
+          <a:prstGeom prst="rect">
+            <a:avLst/>
+          </a:prstGeom>
+        </p:spPr>
+        <p:style>
+          <a:lnRef idx="2">
+            <a:schemeClr val="accent1">
+              <a:shade val="50000"/>
+            </a:schemeClr>
+          </a:lnRef>
+          <a:fillRef idx="1">
+            <a:schemeClr val="accent1"/>
+          </a:fillRef>
+          <a:effectRef idx="0">
+            <a:schemeClr val="accent1"/>
+          </a:effectRef>
+          <a:fontRef idx="minor">
+            <a:schemeClr val="lt1"/>
+          </a:fontRef>
+        </p:style>
+        <p:txBody>
+          <a:bodyPr rtlCol="0" anchor="ctr"/>
+          <a:lstStyle/>
+          <a:p>
+            <a:pPr algn="ctr"/>
+            <a:r>
+              <a:rPr lang="en-AU" sz="1400" dirty="0"/>
+              <a:t>I am interested in using satellite based rainfall estimates</a:t>
+            </a:r>
+          </a:p>
+        </p:txBody>
+      </p:sp>
+      <p:sp>
+        <p:nvSpPr>
+          <p:cNvPr id="11" name="Rectangle 10">
+            <a:extLst>
+              <a:ext uri="{FF2B5EF4-FFF2-40B4-BE49-F238E27FC236}">
+                <a16:creationId xmlns:a16="http://schemas.microsoft.com/office/drawing/2014/main" id="{CCE2F377-2AFC-4FDC-A614-B12FC2A82A5B}"/>
+              </a:ext>
+            </a:extLst>
+          </p:cNvPr>
+          <p:cNvSpPr/>
+          <p:nvPr/>
+        </p:nvSpPr>
+        <p:spPr>
+          <a:xfrm>
+            <a:off x="3515157" y="4650406"/>
+            <a:ext cx="2559050" cy="666750"/>
+          </a:xfrm>
+          <a:prstGeom prst="rect">
+            <a:avLst/>
+          </a:prstGeom>
+          <a:solidFill>
+            <a:schemeClr val="accent2"/>
+          </a:solidFill>
+        </p:spPr>
+        <p:style>
+          <a:lnRef idx="2">
+            <a:schemeClr val="accent1">
+              <a:shade val="50000"/>
+            </a:schemeClr>
+          </a:lnRef>
+          <a:fillRef idx="1">
+            <a:schemeClr val="accent1"/>
+          </a:fillRef>
+          <a:effectRef idx="0">
+            <a:schemeClr val="accent1"/>
+          </a:effectRef>
+          <a:fontRef idx="minor">
+            <a:schemeClr val="lt1"/>
+          </a:fontRef>
+        </p:style>
+        <p:txBody>
+          <a:bodyPr rtlCol="0" anchor="ctr"/>
+          <a:lstStyle/>
+          <a:p>
+            <a:pPr algn="ctr"/>
+            <a:r>
+              <a:rPr lang="en-AU" sz="1400" dirty="0"/>
+              <a:t>CHIRPS and comparison of CHIRPS data with station data</a:t>
+            </a:r>
+          </a:p>
+        </p:txBody>
+      </p:sp>
+      <p:cxnSp>
+        <p:nvCxnSpPr>
+          <p:cNvPr id="13" name="Straight Arrow Connector 12">
+            <a:extLst>
+              <a:ext uri="{FF2B5EF4-FFF2-40B4-BE49-F238E27FC236}">
+                <a16:creationId xmlns:a16="http://schemas.microsoft.com/office/drawing/2014/main" id="{178C8140-0B8A-4729-BA3A-73AACFD899A6}"/>
+              </a:ext>
+            </a:extLst>
+          </p:cNvPr>
+          <p:cNvCxnSpPr>
+            <a:cxnSpLocks/>
+            <a:stCxn id="11" idx="2"/>
+            <a:endCxn id="19" idx="0"/>
+          </p:cNvCxnSpPr>
+          <p:nvPr/>
+        </p:nvCxnSpPr>
+        <p:spPr>
+          <a:xfrm flipH="1">
+            <a:off x="2178487" y="5317156"/>
+            <a:ext cx="2616195" cy="311382"/>
+          </a:xfrm>
+          <a:prstGeom prst="straightConnector1">
+            <a:avLst/>
+          </a:prstGeom>
+          <a:ln>
+            <a:tailEnd type="triangle"/>
+          </a:ln>
+        </p:spPr>
+        <p:style>
+          <a:lnRef idx="1">
+            <a:schemeClr val="accent1"/>
+          </a:lnRef>
+          <a:fillRef idx="0">
+            <a:schemeClr val="accent1"/>
+          </a:fillRef>
+          <a:effectRef idx="0">
+            <a:schemeClr val="accent1"/>
+          </a:effectRef>
+          <a:fontRef idx="minor">
+            <a:schemeClr val="tx1"/>
+          </a:fontRef>
+        </p:style>
+      </p:cxnSp>
+      <p:sp>
+        <p:nvSpPr>
+          <p:cNvPr id="14" name="Rectangle 13">
+            <a:extLst>
+              <a:ext uri="{FF2B5EF4-FFF2-40B4-BE49-F238E27FC236}">
+                <a16:creationId xmlns:a16="http://schemas.microsoft.com/office/drawing/2014/main" id="{411ADBAD-C9B8-42E3-BA56-3CCD16DEFC51}"/>
+              </a:ext>
+            </a:extLst>
+          </p:cNvPr>
+          <p:cNvSpPr/>
+          <p:nvPr/>
+        </p:nvSpPr>
+        <p:spPr>
+          <a:xfrm>
+            <a:off x="267464" y="6930321"/>
+            <a:ext cx="2996546" cy="1352550"/>
+          </a:xfrm>
+          <a:prstGeom prst="rect">
+            <a:avLst/>
+          </a:prstGeom>
+          <a:solidFill>
+            <a:schemeClr val="accent6">
+              <a:lumMod val="50000"/>
+            </a:schemeClr>
+          </a:solidFill>
+        </p:spPr>
+        <p:style>
+          <a:lnRef idx="2">
+            <a:schemeClr val="accent1">
+              <a:shade val="50000"/>
+            </a:schemeClr>
+          </a:lnRef>
+          <a:fillRef idx="1">
+            <a:schemeClr val="accent1"/>
+          </a:fillRef>
+          <a:effectRef idx="0">
+            <a:schemeClr val="accent1"/>
+          </a:effectRef>
+          <a:fontRef idx="minor">
+            <a:schemeClr val="lt1"/>
+          </a:fontRef>
+        </p:style>
+        <p:txBody>
+          <a:bodyPr rtlCol="0" anchor="ctr"/>
+          <a:lstStyle/>
+          <a:p>
+            <a:pPr algn="ctr"/>
+            <a:r>
+              <a:rPr lang="en-AU" sz="1400" dirty="0"/>
+              <a:t>Basic rainfall analysis CHIRPS and stations (INUMET)</a:t>
+            </a:r>
+          </a:p>
+          <a:p>
+            <a:pPr algn="ctr"/>
+            <a:r>
+              <a:rPr lang="en-AU" sz="1400" dirty="0"/>
+              <a:t>Documents describing basic analysis: H_BasicRainfallAnalysisINUMET.PDF and H1_BasicRainfallAnalysisCHIRPS.PDF</a:t>
+            </a:r>
+          </a:p>
+        </p:txBody>
+      </p:sp>
+      <p:sp>
+        <p:nvSpPr>
+          <p:cNvPr id="16" name="Rectangle 15">
+            <a:extLst>
+              <a:ext uri="{FF2B5EF4-FFF2-40B4-BE49-F238E27FC236}">
+                <a16:creationId xmlns:a16="http://schemas.microsoft.com/office/drawing/2014/main" id="{05D4C06C-91EB-4523-A4A6-E2F8EB361FAF}"/>
+              </a:ext>
+            </a:extLst>
+          </p:cNvPr>
+          <p:cNvSpPr/>
+          <p:nvPr/>
+        </p:nvSpPr>
+        <p:spPr>
+          <a:xfrm>
+            <a:off x="3429000" y="8147148"/>
+            <a:ext cx="3263027" cy="971550"/>
+          </a:xfrm>
+          <a:prstGeom prst="rect">
+            <a:avLst/>
+          </a:prstGeom>
+          <a:solidFill>
+            <a:schemeClr val="accent6">
+              <a:lumMod val="50000"/>
+            </a:schemeClr>
+          </a:solidFill>
+        </p:spPr>
+        <p:style>
+          <a:lnRef idx="2">
+            <a:schemeClr val="accent1">
+              <a:shade val="50000"/>
+            </a:schemeClr>
+          </a:lnRef>
+          <a:fillRef idx="1">
+            <a:schemeClr val="accent1"/>
+          </a:fillRef>
+          <a:effectRef idx="0">
+            <a:schemeClr val="accent1"/>
+          </a:effectRef>
+          <a:fontRef idx="minor">
+            <a:schemeClr val="lt1"/>
+          </a:fontRef>
+        </p:style>
+        <p:txBody>
+          <a:bodyPr rtlCol="0" anchor="ctr"/>
+          <a:lstStyle/>
+          <a:p>
+            <a:pPr algn="ctr"/>
+            <a:r>
+              <a:rPr lang="en-AU" sz="1400" dirty="0"/>
+              <a:t>Document describing the comparison of station and CHIRPS data: H2_ComparativeAnalysisChirpsInumet.pdf</a:t>
+            </a:r>
+          </a:p>
+        </p:txBody>
+      </p:sp>
+      <p:sp>
+        <p:nvSpPr>
+          <p:cNvPr id="19" name="Rectangle 18">
+            <a:extLst>
+              <a:ext uri="{FF2B5EF4-FFF2-40B4-BE49-F238E27FC236}">
+                <a16:creationId xmlns:a16="http://schemas.microsoft.com/office/drawing/2014/main" id="{140368BF-ABEC-4B5C-9724-FA73F2FF3229}"/>
+              </a:ext>
+            </a:extLst>
+          </p:cNvPr>
+          <p:cNvSpPr/>
+          <p:nvPr/>
+        </p:nvSpPr>
+        <p:spPr>
+          <a:xfrm>
+            <a:off x="622741" y="5628538"/>
+            <a:ext cx="3111491" cy="971550"/>
+          </a:xfrm>
+          <a:prstGeom prst="rect">
+            <a:avLst/>
+          </a:prstGeom>
+          <a:solidFill>
+            <a:schemeClr val="accent6">
+              <a:lumMod val="50000"/>
+            </a:schemeClr>
+          </a:solidFill>
+        </p:spPr>
+        <p:style>
+          <a:lnRef idx="2">
+            <a:schemeClr val="accent1">
+              <a:shade val="50000"/>
+            </a:schemeClr>
+          </a:lnRef>
+          <a:fillRef idx="1">
+            <a:schemeClr val="accent1"/>
+          </a:fillRef>
+          <a:effectRef idx="0">
+            <a:schemeClr val="accent1"/>
+          </a:effectRef>
+          <a:fontRef idx="minor">
+            <a:schemeClr val="lt1"/>
+          </a:fontRef>
+        </p:style>
+        <p:txBody>
+          <a:bodyPr rtlCol="0" anchor="ctr"/>
+          <a:lstStyle/>
+          <a:p>
+            <a:pPr algn="ctr"/>
+            <a:r>
+              <a:rPr lang="en-AU" sz="1400" dirty="0"/>
+              <a:t>Document describing downloading CHIRPS data: G_DownloadingAndManagingChirps.pdf</a:t>
+            </a:r>
+          </a:p>
+        </p:txBody>
+      </p:sp>
+      <p:cxnSp>
+        <p:nvCxnSpPr>
+          <p:cNvPr id="21" name="Straight Arrow Connector 20">
+            <a:extLst>
+              <a:ext uri="{FF2B5EF4-FFF2-40B4-BE49-F238E27FC236}">
+                <a16:creationId xmlns:a16="http://schemas.microsoft.com/office/drawing/2014/main" id="{8DCE17A7-ECDC-4AA9-BC4E-10181472AD3A}"/>
+              </a:ext>
+            </a:extLst>
+          </p:cNvPr>
+          <p:cNvCxnSpPr>
+            <a:cxnSpLocks/>
+            <a:stCxn id="19" idx="2"/>
+            <a:endCxn id="14" idx="0"/>
+          </p:cNvCxnSpPr>
+          <p:nvPr/>
+        </p:nvCxnSpPr>
+        <p:spPr>
+          <a:xfrm flipH="1">
+            <a:off x="1765737" y="6600088"/>
+            <a:ext cx="412750" cy="330233"/>
+          </a:xfrm>
+          <a:prstGeom prst="straightConnector1">
+            <a:avLst/>
+          </a:prstGeom>
+          <a:ln>
+            <a:tailEnd type="triangle"/>
+          </a:ln>
+        </p:spPr>
+        <p:style>
+          <a:lnRef idx="1">
+            <a:schemeClr val="accent1"/>
+          </a:lnRef>
+          <a:fillRef idx="0">
+            <a:schemeClr val="accent1"/>
+          </a:fillRef>
+          <a:effectRef idx="0">
+            <a:schemeClr val="accent1"/>
+          </a:effectRef>
+          <a:fontRef idx="minor">
+            <a:schemeClr val="tx1"/>
+          </a:fontRef>
+        </p:style>
+      </p:cxnSp>
+      <p:cxnSp>
+        <p:nvCxnSpPr>
+          <p:cNvPr id="30" name="Connector: Elbow 29">
+            <a:extLst>
+              <a:ext uri="{FF2B5EF4-FFF2-40B4-BE49-F238E27FC236}">
+                <a16:creationId xmlns:a16="http://schemas.microsoft.com/office/drawing/2014/main" id="{1926B919-F2FC-4E31-80C2-DFF475FE5666}"/>
+              </a:ext>
+            </a:extLst>
+          </p:cNvPr>
+          <p:cNvCxnSpPr>
+            <a:cxnSpLocks/>
+            <a:stCxn id="14" idx="2"/>
+            <a:endCxn id="16" idx="1"/>
+          </p:cNvCxnSpPr>
+          <p:nvPr/>
+        </p:nvCxnSpPr>
+        <p:spPr>
+          <a:xfrm rot="16200000" flipH="1">
+            <a:off x="2422342" y="7626265"/>
+            <a:ext cx="350052" cy="1663263"/>
+          </a:xfrm>
+          <a:prstGeom prst="bentConnector2">
+            <a:avLst/>
+          </a:prstGeom>
+          <a:ln>
+            <a:tailEnd type="triangle"/>
+          </a:ln>
+        </p:spPr>
+        <p:style>
+          <a:lnRef idx="1">
+            <a:schemeClr val="accent1"/>
+          </a:lnRef>
+          <a:fillRef idx="0">
+            <a:schemeClr val="accent1"/>
+          </a:fillRef>
+          <a:effectRef idx="0">
+            <a:schemeClr val="accent1"/>
+          </a:effectRef>
+          <a:fontRef idx="minor">
+            <a:schemeClr val="tx1"/>
+          </a:fontRef>
+        </p:style>
+      </p:cxnSp>
+      <p:cxnSp>
+        <p:nvCxnSpPr>
+          <p:cNvPr id="47" name="Connector: Elbow 46">
+            <a:extLst>
+              <a:ext uri="{FF2B5EF4-FFF2-40B4-BE49-F238E27FC236}">
+                <a16:creationId xmlns:a16="http://schemas.microsoft.com/office/drawing/2014/main" id="{B0198088-43D1-4912-9A43-C0D5F421DB21}"/>
+              </a:ext>
+            </a:extLst>
+          </p:cNvPr>
+          <p:cNvCxnSpPr>
+            <a:stCxn id="5" idx="2"/>
+            <a:endCxn id="10" idx="1"/>
+          </p:cNvCxnSpPr>
+          <p:nvPr/>
+        </p:nvCxnSpPr>
+        <p:spPr>
+          <a:xfrm rot="16200000" flipH="1">
+            <a:off x="2563286" y="1424032"/>
+            <a:ext cx="425691" cy="2061850"/>
+          </a:xfrm>
+          <a:prstGeom prst="bentConnector2">
+            <a:avLst/>
+          </a:prstGeom>
+          <a:ln>
+            <a:tailEnd type="triangle"/>
+          </a:ln>
+        </p:spPr>
+        <p:style>
+          <a:lnRef idx="1">
+            <a:schemeClr val="accent1"/>
+          </a:lnRef>
+          <a:fillRef idx="0">
+            <a:schemeClr val="accent1"/>
+          </a:fillRef>
+          <a:effectRef idx="0">
+            <a:schemeClr val="accent1"/>
+          </a:effectRef>
+          <a:fontRef idx="minor">
+            <a:schemeClr val="tx1"/>
+          </a:fontRef>
+        </p:style>
+      </p:cxnSp>
+      <p:cxnSp>
+        <p:nvCxnSpPr>
+          <p:cNvPr id="52" name="Connector: Elbow 51">
+            <a:extLst>
+              <a:ext uri="{FF2B5EF4-FFF2-40B4-BE49-F238E27FC236}">
+                <a16:creationId xmlns:a16="http://schemas.microsoft.com/office/drawing/2014/main" id="{EA2351DA-3CD1-4441-8D44-BD07762882BF}"/>
+              </a:ext>
+            </a:extLst>
+          </p:cNvPr>
+          <p:cNvCxnSpPr>
+            <a:stCxn id="9" idx="2"/>
+            <a:endCxn id="11" idx="1"/>
+          </p:cNvCxnSpPr>
+          <p:nvPr/>
+        </p:nvCxnSpPr>
+        <p:spPr>
+          <a:xfrm rot="16200000" flipH="1">
+            <a:off x="2326156" y="3794780"/>
+            <a:ext cx="546036" cy="1831966"/>
+          </a:xfrm>
+          <a:prstGeom prst="bentConnector2">
+            <a:avLst/>
+          </a:prstGeom>
+          <a:ln>
+            <a:tailEnd type="triangle"/>
+          </a:ln>
+        </p:spPr>
+        <p:style>
+          <a:lnRef idx="1">
+            <a:schemeClr val="accent1"/>
+          </a:lnRef>
+          <a:fillRef idx="0">
+            <a:schemeClr val="accent1"/>
+          </a:fillRef>
+          <a:effectRef idx="0">
+            <a:schemeClr val="accent1"/>
+          </a:effectRef>
+          <a:fontRef idx="minor">
+            <a:schemeClr val="tx1"/>
+          </a:fontRef>
+        </p:style>
+      </p:cxnSp>
     </p:spTree>
     <p:extLst>
       <p:ext uri="{BB962C8B-B14F-4D97-AF65-F5344CB8AC3E}">

</xml_diff>